<commit_message>
update README, add content summary
</commit_message>
<xml_diff>
--- a/hitchhikers-guide-to-open-source/开源漫游者指南-v0.9.1.pptx
+++ b/hitchhikers-guide-to-open-source/开源漫游者指南-v0.9.1.pptx
@@ -223,7 +223,7 @@
           <a:p>
             <a:fld id="{1A97B5AB-DB28-47F5-BF60-8316AADB0DDC}" type="datetimeFigureOut">
               <a:rPr lang="zh-CN" altLang="en-US" smtClean="0"/>
-              <a:t>2021/7/6</a:t>
+              <a:t>2021/7/16</a:t>
             </a:fld>
             <a:endParaRPr lang="zh-CN" altLang="en-US"/>
           </a:p>
@@ -983,7 +983,7 @@
           <a:p>
             <a:fld id="{50B41596-4D32-4A43-8621-6755226D22AB}" type="datetime1">
               <a:rPr lang="zh-CN" altLang="en-US" smtClean="0"/>
-              <a:t>2021/7/6</a:t>
+              <a:t>2021/7/16</a:t>
             </a:fld>
             <a:endParaRPr lang="zh-CN" altLang="en-US"/>
           </a:p>
@@ -1373,7 +1373,7 @@
           <a:p>
             <a:fld id="{19784EFE-33BE-504A-8227-91F4E70E1691}" type="datetime1">
               <a:rPr lang="zh-CN" altLang="en-US" smtClean="0"/>
-              <a:t>2021/7/6</a:t>
+              <a:t>2021/7/16</a:t>
             </a:fld>
             <a:endParaRPr lang="zh-CN" altLang="en-US"/>
           </a:p>
@@ -1553,7 +1553,7 @@
           <a:p>
             <a:fld id="{ED550250-D690-9049-9451-A146A887B014}" type="datetime1">
               <a:rPr lang="zh-CN" altLang="en-US" smtClean="0"/>
-              <a:t>2021/7/6</a:t>
+              <a:t>2021/7/16</a:t>
             </a:fld>
             <a:endParaRPr lang="zh-CN" altLang="en-US"/>
           </a:p>
@@ -1707,7 +1707,7 @@
           <a:p>
             <a:fld id="{542FB918-D412-8249-9356-9F26D0001099}" type="datetime1">
               <a:rPr lang="zh-CN" altLang="en-US" smtClean="0"/>
-              <a:t>2021/7/6</a:t>
+              <a:t>2021/7/16</a:t>
             </a:fld>
             <a:endParaRPr lang="zh-CN" altLang="en-US"/>
           </a:p>
@@ -1981,7 +1981,7 @@
           <a:p>
             <a:fld id="{C5750D82-EDE6-FD44-B420-AF9B0337A3CA}" type="datetime1">
               <a:rPr lang="zh-CN" altLang="en-US" smtClean="0"/>
-              <a:t>2021/7/6</a:t>
+              <a:t>2021/7/16</a:t>
             </a:fld>
             <a:endParaRPr lang="zh-CN" altLang="en-US"/>
           </a:p>
@@ -2206,7 +2206,7 @@
           <a:p>
             <a:fld id="{0FECE2DC-28B3-E54E-8D47-73EC7BC0AD0C}" type="datetime1">
               <a:rPr lang="zh-CN" altLang="en-US" smtClean="0"/>
-              <a:t>2021/7/6</a:t>
+              <a:t>2021/7/16</a:t>
             </a:fld>
             <a:endParaRPr lang="zh-CN" altLang="en-US"/>
           </a:p>
@@ -2563,7 +2563,7 @@
           <a:p>
             <a:fld id="{60BD768D-B78A-514C-9247-F5D716D6AC57}" type="datetime1">
               <a:rPr lang="zh-CN" altLang="en-US" smtClean="0"/>
-              <a:t>2021/7/6</a:t>
+              <a:t>2021/7/16</a:t>
             </a:fld>
             <a:endParaRPr lang="zh-CN" altLang="en-US"/>
           </a:p>
@@ -2800,7 +2800,7 @@
           <a:p>
             <a:fld id="{58227964-AB34-C346-824A-BA838450A799}" type="datetime1">
               <a:rPr lang="zh-CN" altLang="en-US" smtClean="0"/>
-              <a:t>2021/7/6</a:t>
+              <a:t>2021/7/16</a:t>
             </a:fld>
             <a:endParaRPr lang="zh-CN" altLang="en-US"/>
           </a:p>
@@ -2895,7 +2895,7 @@
           <a:p>
             <a:fld id="{E8A9D529-E317-2540-A7D9-692982AC0F7C}" type="datetime1">
               <a:rPr lang="zh-CN" altLang="en-US" smtClean="0"/>
-              <a:t>2021/7/6</a:t>
+              <a:t>2021/7/16</a:t>
             </a:fld>
             <a:endParaRPr lang="zh-CN" altLang="en-US"/>
           </a:p>
@@ -3091,7 +3091,7 @@
           <a:p>
             <a:fld id="{23A51D1A-A673-4D47-A83B-E737AE526FF4}" type="datetime1">
               <a:rPr lang="zh-CN" altLang="en-US" smtClean="0"/>
-              <a:t>2021/7/6</a:t>
+              <a:t>2021/7/16</a:t>
             </a:fld>
             <a:endParaRPr lang="zh-CN" altLang="en-US"/>
           </a:p>
@@ -3417,7 +3417,7 @@
           <a:p>
             <a:fld id="{C1EE344E-2CE2-2D48-ADC4-3D9E735780FA}" type="datetime1">
               <a:rPr lang="zh-CN" altLang="en-US" smtClean="0"/>
-              <a:t>2021/7/6</a:t>
+              <a:t>2021/7/16</a:t>
             </a:fld>
             <a:endParaRPr lang="zh-CN" altLang="en-US"/>
           </a:p>
@@ -3676,7 +3676,7 @@
           <a:p>
             <a:fld id="{DECADDD4-CBD0-6048-BF9E-70E3504E931F}" type="datetime1">
               <a:rPr lang="zh-CN" altLang="en-US" smtClean="0"/>
-              <a:t>2021/7/6</a:t>
+              <a:t>2021/7/16</a:t>
             </a:fld>
             <a:endParaRPr lang="zh-CN" altLang="en-US"/>
           </a:p>
@@ -5419,14 +5419,22 @@
             </a:r>
             <a:r>
               <a:rPr lang="zh-CN" altLang="en-US" dirty="0"/>
-              <a:t>贡献者都是小提交贡献（伸手是主流）</a:t>
+              <a:t>贡献者都是小提交贡献（伸手</a:t>
+            </a:r>
+            <a:r>
+              <a:rPr kumimoji="1" lang="zh-CN" altLang="en-US" dirty="0"/>
+              <a:t>党</a:t>
+            </a:r>
+            <a:r>
+              <a:rPr lang="zh-CN" altLang="en-US" dirty="0"/>
+              <a:t>是主流）</a:t>
             </a:r>
             <a:endParaRPr lang="en-US" altLang="zh-CN" dirty="0"/>
           </a:p>
           <a:p>
             <a:r>
               <a:rPr kumimoji="1" lang="zh-CN" altLang="en-US" dirty="0"/>
-              <a:t>核心贡献者 肯定会是大厂公司的人，想着形成公司间团队的合作联盟</a:t>
+              <a:t>核心贡献者 往往会是大厂公司的人，注重形成公司间团队的合作联盟</a:t>
             </a:r>
           </a:p>
         </p:txBody>

</xml_diff>